<commit_message>
Change customer to stakeholder and all people to people.
</commit_message>
<xml_diff>
--- a/src/devops-mindset-essentials/devops-getting-started.pptx
+++ b/src/devops-mindset-essentials/devops-getting-started.pptx
@@ -225,7 +225,7 @@
               <a:rPr lang="en-US" smtClean="0">
                 <a:latin typeface="Segoe UI" pitchFamily="34" charset="0"/>
               </a:rPr>
-              <a:t>10/15/2018 1:13 PM</a:t>
+              <a:t>12/24/2018 12:27 PM</a:t>
             </a:fld>
             <a:endParaRPr lang="en-US" dirty="0">
               <a:latin typeface="Segoe UI" pitchFamily="34" charset="0"/>
@@ -403,7 +403,7 @@
           <a:p>
             <a:fld id="{D18B56EA-E28F-4F92-9F16-7A6F2501B303}" type="datetime8">
               <a:rPr lang="en-US" smtClean="0"/>
-              <a:t>10/15/2018 1:13 PM</a:t>
+              <a:t>12/24/2018 12:27 PM</a:t>
             </a:fld>
             <a:endParaRPr lang="en-US" dirty="0"/>
           </a:p>
@@ -732,7 +732,7 @@
           <a:p>
             <a:fld id="{D18B56EA-E28F-4F92-9F16-7A6F2501B303}" type="datetime8">
               <a:rPr lang="en-US" smtClean="0"/>
-              <a:t>10/15/2018 1:13 PM</a:t>
+              <a:t>12/24/2018 12:27 PM</a:t>
             </a:fld>
             <a:endParaRPr lang="en-US" dirty="0"/>
           </a:p>
@@ -6723,7 +6723,7 @@
                 <a:uFillTx/>
                 <a:latin typeface="Calibri"/>
               </a:rPr>
-              <a:t>It’s about delighting our customers with </a:t>
+              <a:t>It’s about delighting our stakeholders with </a:t>
             </a:r>
             <a:r>
               <a:rPr kumimoji="0" lang="en-US" sz="1100" b="1" i="0" u="none" strike="noStrike" kern="0" cap="none" spc="0" normalizeH="0" baseline="0" noProof="0" dirty="0">
@@ -7881,15 +7881,6 @@
               <a:tabLst/>
               <a:defRPr/>
             </a:pPr>
-            <a:r>
-              <a:rPr lang="en-CA" sz="1100" kern="0" dirty="0">
-                <a:solidFill>
-                  <a:schemeClr val="bg1"/>
-                </a:solidFill>
-                <a:latin typeface="Calibri"/>
-              </a:rPr>
-              <a:t>All </a:t>
-            </a:r>
             <a:r>
               <a:rPr lang="en-CA" sz="1100" b="1" kern="0" dirty="0">
                 <a:solidFill>

</xml_diff>

<commit_message>
Change automate everything to automation
</commit_message>
<xml_diff>
--- a/src/devops-mindset-essentials/devops-getting-started.pptx
+++ b/src/devops-mindset-essentials/devops-getting-started.pptx
@@ -225,7 +225,7 @@
               <a:rPr lang="en-US" smtClean="0">
                 <a:latin typeface="Segoe UI" pitchFamily="34" charset="0"/>
               </a:rPr>
-              <a:t>12/24/2018 12:27 PM</a:t>
+              <a:t>12/27/2018 9:02 AM</a:t>
             </a:fld>
             <a:endParaRPr lang="en-US" dirty="0">
               <a:latin typeface="Segoe UI" pitchFamily="34" charset="0"/>
@@ -403,7 +403,7 @@
           <a:p>
             <a:fld id="{D18B56EA-E28F-4F92-9F16-7A6F2501B303}" type="datetime8">
               <a:rPr lang="en-US" smtClean="0"/>
-              <a:t>12/24/2018 12:27 PM</a:t>
+              <a:t>12/27/2018 9:02 AM</a:t>
             </a:fld>
             <a:endParaRPr lang="en-US" dirty="0"/>
           </a:p>
@@ -732,7 +732,7 @@
           <a:p>
             <a:fld id="{D18B56EA-E28F-4F92-9F16-7A6F2501B303}" type="datetime8">
               <a:rPr lang="en-US" smtClean="0"/>
-              <a:t>12/24/2018 12:27 PM</a:t>
+              <a:t>12/27/2018 9:02 AM</a:t>
             </a:fld>
             <a:endParaRPr lang="en-US" dirty="0"/>
           </a:p>
@@ -6319,7 +6319,7 @@
                 </a:solidFill>
                 <a:latin typeface="Calibri"/>
               </a:rPr>
-              <a:t>Automate everything – fast, stable, consistent</a:t>
+              <a:t>Automation – fast, stable, consistent</a:t>
             </a:r>
           </a:p>
           <a:p>
@@ -8348,7 +8348,23 @@
                   <a:schemeClr val="bg1"/>
                 </a:solidFill>
               </a:rPr>
-              <a:t>AJATO Transformations Limited | 2018.07 | github.com/wpschaub/DevOps-mindset-essentials | </a:t>
+              <a:t>AJATO Transformations Limited </a:t>
+            </a:r>
+            <a:r>
+              <a:rPr lang="en-GB" sz="900">
+                <a:solidFill>
+                  <a:schemeClr val="bg1"/>
+                </a:solidFill>
+              </a:rPr>
+              <a:t>| 2018.12 </a:t>
+            </a:r>
+            <a:r>
+              <a:rPr lang="en-GB" sz="900" dirty="0">
+                <a:solidFill>
+                  <a:schemeClr val="bg1"/>
+                </a:solidFill>
+              </a:rPr>
+              <a:t>| github.com/wpschaub/DevOps-mindset-essentials | </a:t>
             </a:r>
             <a:r>
               <a:rPr lang="en-CA" sz="900" dirty="0">

</xml_diff>